<commit_message>
added days at sea to new england flow chart (common pool groundfish)
</commit_message>
<xml_diff>
--- a/figures/flow_charts.pptx
+++ b/figures/flow_charts.pptx
@@ -6508,7 +6508,7 @@
       <dgm:spPr/>
     </dgm:pt>
     <dgm:pt modelId="{8070880A-6D9D-3E45-BBA5-857722588F19}" type="pres">
-      <dgm:prSet presAssocID="{18972EAA-2B0D-7948-96EA-38856287373F}" presName="rootText" presStyleLbl="node4" presStyleIdx="4" presStyleCnt="12" custLinFactX="-198285" custLinFactNeighborX="-200000" custLinFactNeighborY="63386">
+      <dgm:prSet presAssocID="{18972EAA-2B0D-7948-96EA-38856287373F}" presName="rootText" presStyleLbl="node4" presStyleIdx="4" presStyleCnt="12" custLinFactX="-198285" custLinFactY="23264" custLinFactNeighborX="-200000" custLinFactNeighborY="100000">
         <dgm:presLayoutVars>
           <dgm:chPref val="3"/>
         </dgm:presLayoutVars>
@@ -6544,7 +6544,7 @@
       <dgm:spPr/>
     </dgm:pt>
     <dgm:pt modelId="{7E75A885-90A3-2F4E-871B-4C65946DDE1A}" type="pres">
-      <dgm:prSet presAssocID="{2E6B4BCE-860A-8449-B8E5-DBE0F8F63945}" presName="rootText" presStyleLbl="node4" presStyleIdx="5" presStyleCnt="12" custLinFactX="-100000" custLinFactNeighborX="-137001" custLinFactNeighborY="866">
+      <dgm:prSet presAssocID="{2E6B4BCE-860A-8449-B8E5-DBE0F8F63945}" presName="rootText" presStyleLbl="node4" presStyleIdx="5" presStyleCnt="12" custLinFactX="-100000" custLinFactNeighborX="-137001" custLinFactNeighborY="60744">
         <dgm:presLayoutVars>
           <dgm:chPref val="3"/>
         </dgm:presLayoutVars>
@@ -6580,7 +6580,7 @@
       <dgm:spPr/>
     </dgm:pt>
     <dgm:pt modelId="{758C4E8E-D5A9-C842-A8AD-147A5CCD7FC5}" type="pres">
-      <dgm:prSet presAssocID="{BECB6D06-3BCB-CA4A-A6E6-9A54D7F3FE6A}" presName="rootText" presStyleLbl="node4" presStyleIdx="6" presStyleCnt="12" custLinFactX="-198284" custLinFactNeighborX="-200000" custLinFactNeighborY="-52815">
+      <dgm:prSet presAssocID="{BECB6D06-3BCB-CA4A-A6E6-9A54D7F3FE6A}" presName="rootText" presStyleLbl="node4" presStyleIdx="6" presStyleCnt="12" custLinFactX="-198284" custLinFactNeighborX="-200000" custLinFactNeighborY="4405">
         <dgm:presLayoutVars>
           <dgm:chPref val="3"/>
         </dgm:presLayoutVars>
@@ -11583,7 +11583,7 @@
       <dsp:spPr>
         <a:xfrm>
           <a:off x="2014609" y="4169444"/>
-          <a:ext cx="383014" cy="1339890"/>
+          <a:ext cx="383014" cy="1637370"/>
         </a:xfrm>
         <a:custGeom>
           <a:avLst/>
@@ -11597,10 +11597,10 @@
                 <a:pt x="383014" y="0"/>
               </a:moveTo>
               <a:lnTo>
-                <a:pt x="383014" y="1339890"/>
+                <a:pt x="383014" y="1637370"/>
               </a:lnTo>
               <a:lnTo>
-                <a:pt x="0" y="1339890"/>
+                <a:pt x="0" y="1637370"/>
               </a:lnTo>
             </a:path>
           </a:pathLst>
@@ -11642,7 +11642,7 @@
       <dsp:spPr>
         <a:xfrm>
           <a:off x="2397624" y="4169444"/>
-          <a:ext cx="297736" cy="849352"/>
+          <a:ext cx="297736" cy="1181924"/>
         </a:xfrm>
         <a:custGeom>
           <a:avLst/>
@@ -11656,10 +11656,10 @@
                 <a:pt x="0" y="0"/>
               </a:moveTo>
               <a:lnTo>
-                <a:pt x="0" y="849352"/>
+                <a:pt x="0" y="1181924"/>
               </a:lnTo>
               <a:lnTo>
-                <a:pt x="297736" y="849352"/>
+                <a:pt x="297736" y="1181924"/>
               </a:lnTo>
             </a:path>
           </a:pathLst>
@@ -11701,7 +11701,7 @@
       <dsp:spPr>
         <a:xfrm>
           <a:off x="2014598" y="4169444"/>
-          <a:ext cx="383025" cy="407908"/>
+          <a:ext cx="383025" cy="740480"/>
         </a:xfrm>
         <a:custGeom>
           <a:avLst/>
@@ -11715,10 +11715,10 @@
                 <a:pt x="383025" y="0"/>
               </a:moveTo>
               <a:lnTo>
-                <a:pt x="383025" y="407908"/>
+                <a:pt x="383025" y="740480"/>
               </a:lnTo>
               <a:lnTo>
-                <a:pt x="0" y="407908"/>
+                <a:pt x="0" y="740480"/>
               </a:lnTo>
             </a:path>
           </a:pathLst>
@@ -12843,7 +12843,7 @@
       </dsp:nvSpPr>
       <dsp:spPr>
         <a:xfrm>
-          <a:off x="903767" y="4299644"/>
+          <a:off x="903767" y="4632216"/>
           <a:ext cx="1110831" cy="555415"/>
         </a:xfrm>
         <a:prstGeom prst="rect">
@@ -12905,7 +12905,7 @@
         </a:p>
       </dsp:txBody>
       <dsp:txXfrm>
-        <a:off x="903767" y="4299644"/>
+        <a:off x="903767" y="4632216"/>
         <a:ext cx="1110831" cy="555415"/>
       </dsp:txXfrm>
     </dsp:sp>
@@ -12916,7 +12916,7 @@
       </dsp:nvSpPr>
       <dsp:spPr>
         <a:xfrm>
-          <a:off x="2695360" y="4741089"/>
+          <a:off x="2695360" y="5073660"/>
           <a:ext cx="1110831" cy="555415"/>
         </a:xfrm>
         <a:prstGeom prst="rect">
@@ -12978,7 +12978,7 @@
         </a:p>
       </dsp:txBody>
       <dsp:txXfrm>
-        <a:off x="2695360" y="4741089"/>
+        <a:off x="2695360" y="5073660"/>
         <a:ext cx="1110831" cy="555415"/>
       </dsp:txXfrm>
     </dsp:sp>
@@ -12989,7 +12989,7 @@
       </dsp:nvSpPr>
       <dsp:spPr>
         <a:xfrm>
-          <a:off x="903778" y="5231626"/>
+          <a:off x="903778" y="5529106"/>
           <a:ext cx="1110831" cy="555415"/>
         </a:xfrm>
         <a:prstGeom prst="rect">
@@ -13051,7 +13051,7 @@
         </a:p>
       </dsp:txBody>
       <dsp:txXfrm>
-        <a:off x="903778" y="5231626"/>
+        <a:off x="903778" y="5529106"/>
         <a:ext cx="1110831" cy="555415"/>
       </dsp:txXfrm>
     </dsp:sp>
@@ -26963,7 +26963,7 @@
           <a:p>
             <a:fld id="{7FCD9E77-C000-8647-A168-CF67FEF06FB1}" type="datetimeFigureOut">
               <a:rPr lang="en-US" smtClean="0"/>
-              <a:t>2/23/24</a:t>
+              <a:t>3/22/24</a:t>
             </a:fld>
             <a:endParaRPr lang="en-US"/>
           </a:p>
@@ -27161,7 +27161,7 @@
           <a:p>
             <a:fld id="{7FCD9E77-C000-8647-A168-CF67FEF06FB1}" type="datetimeFigureOut">
               <a:rPr lang="en-US" smtClean="0"/>
-              <a:t>2/23/24</a:t>
+              <a:t>3/22/24</a:t>
             </a:fld>
             <a:endParaRPr lang="en-US"/>
           </a:p>
@@ -27369,7 +27369,7 @@
           <a:p>
             <a:fld id="{7FCD9E77-C000-8647-A168-CF67FEF06FB1}" type="datetimeFigureOut">
               <a:rPr lang="en-US" smtClean="0"/>
-              <a:t>2/23/24</a:t>
+              <a:t>3/22/24</a:t>
             </a:fld>
             <a:endParaRPr lang="en-US"/>
           </a:p>
@@ -27567,7 +27567,7 @@
           <a:p>
             <a:fld id="{7FCD9E77-C000-8647-A168-CF67FEF06FB1}" type="datetimeFigureOut">
               <a:rPr lang="en-US" smtClean="0"/>
-              <a:t>2/23/24</a:t>
+              <a:t>3/22/24</a:t>
             </a:fld>
             <a:endParaRPr lang="en-US"/>
           </a:p>
@@ -27842,7 +27842,7 @@
           <a:p>
             <a:fld id="{7FCD9E77-C000-8647-A168-CF67FEF06FB1}" type="datetimeFigureOut">
               <a:rPr lang="en-US" smtClean="0"/>
-              <a:t>2/23/24</a:t>
+              <a:t>3/22/24</a:t>
             </a:fld>
             <a:endParaRPr lang="en-US"/>
           </a:p>
@@ -28107,7 +28107,7 @@
           <a:p>
             <a:fld id="{7FCD9E77-C000-8647-A168-CF67FEF06FB1}" type="datetimeFigureOut">
               <a:rPr lang="en-US" smtClean="0"/>
-              <a:t>2/23/24</a:t>
+              <a:t>3/22/24</a:t>
             </a:fld>
             <a:endParaRPr lang="en-US"/>
           </a:p>
@@ -28519,7 +28519,7 @@
           <a:p>
             <a:fld id="{7FCD9E77-C000-8647-A168-CF67FEF06FB1}" type="datetimeFigureOut">
               <a:rPr lang="en-US" smtClean="0"/>
-              <a:t>2/23/24</a:t>
+              <a:t>3/22/24</a:t>
             </a:fld>
             <a:endParaRPr lang="en-US"/>
           </a:p>
@@ -28660,7 +28660,7 @@
           <a:p>
             <a:fld id="{7FCD9E77-C000-8647-A168-CF67FEF06FB1}" type="datetimeFigureOut">
               <a:rPr lang="en-US" smtClean="0"/>
-              <a:t>2/23/24</a:t>
+              <a:t>3/22/24</a:t>
             </a:fld>
             <a:endParaRPr lang="en-US"/>
           </a:p>
@@ -28773,7 +28773,7 @@
           <a:p>
             <a:fld id="{7FCD9E77-C000-8647-A168-CF67FEF06FB1}" type="datetimeFigureOut">
               <a:rPr lang="en-US" smtClean="0"/>
-              <a:t>2/23/24</a:t>
+              <a:t>3/22/24</a:t>
             </a:fld>
             <a:endParaRPr lang="en-US"/>
           </a:p>
@@ -29084,7 +29084,7 @@
           <a:p>
             <a:fld id="{7FCD9E77-C000-8647-A168-CF67FEF06FB1}" type="datetimeFigureOut">
               <a:rPr lang="en-US" smtClean="0"/>
-              <a:t>2/23/24</a:t>
+              <a:t>3/22/24</a:t>
             </a:fld>
             <a:endParaRPr lang="en-US"/>
           </a:p>
@@ -29372,7 +29372,7 @@
           <a:p>
             <a:fld id="{7FCD9E77-C000-8647-A168-CF67FEF06FB1}" type="datetimeFigureOut">
               <a:rPr lang="en-US" smtClean="0"/>
-              <a:t>2/23/24</a:t>
+              <a:t>3/22/24</a:t>
             </a:fld>
             <a:endParaRPr lang="en-US"/>
           </a:p>
@@ -29613,7 +29613,7 @@
           <a:p>
             <a:fld id="{7FCD9E77-C000-8647-A168-CF67FEF06FB1}" type="datetimeFigureOut">
               <a:rPr lang="en-US" smtClean="0"/>
-              <a:t>2/23/24</a:t>
+              <a:t>3/22/24</a:t>
             </a:fld>
             <a:endParaRPr lang="en-US"/>
           </a:p>
@@ -30324,7 +30324,7 @@
           <p:nvPr>
             <p:extLst>
               <p:ext uri="{D42A27DB-BD31-4B8C-83A1-F6EECF244321}">
-                <p14:modId xmlns:p14="http://schemas.microsoft.com/office/powerpoint/2010/main" val="1276741873"/>
+                <p14:modId xmlns:p14="http://schemas.microsoft.com/office/powerpoint/2010/main" val="922938044"/>
               </p:ext>
             </p:extLst>
           </p:nvPr>
@@ -31198,6 +31198,106 @@
             <a:r>
               <a:rPr lang="en-US" dirty="0"/>
               <a:t>Incidental/bycatch</a:t>
+            </a:r>
+          </a:p>
+        </p:txBody>
+      </p:sp>
+      <p:sp>
+        <p:nvSpPr>
+          <p:cNvPr id="16" name="TextBox 15">
+            <a:extLst>
+              <a:ext uri="{FF2B5EF4-FFF2-40B4-BE49-F238E27FC236}">
+                <a16:creationId xmlns:a16="http://schemas.microsoft.com/office/drawing/2014/main" id="{0E38EE34-93CB-F0FD-5F53-533357849D2D}"/>
+              </a:ext>
+            </a:extLst>
+          </p:cNvPr>
+          <p:cNvSpPr txBox="1"/>
+          <p:nvPr/>
+        </p:nvSpPr>
+        <p:spPr>
+          <a:xfrm>
+            <a:off x="1620982" y="4989966"/>
+            <a:ext cx="1629795" cy="307777"/>
+          </a:xfrm>
+          <a:prstGeom prst="rect">
+            <a:avLst/>
+          </a:prstGeom>
+          <a:solidFill>
+            <a:srgbClr val="D883FF"/>
+          </a:solidFill>
+          <a:ln>
+            <a:noFill/>
+          </a:ln>
+        </p:spPr>
+        <p:txBody>
+          <a:bodyPr wrap="square" rtlCol="0">
+            <a:spAutoFit/>
+          </a:bodyPr>
+          <a:lstStyle/>
+          <a:p>
+            <a:pPr algn="ctr"/>
+            <a:r>
+              <a:rPr lang="en-US" sz="1400" dirty="0">
+                <a:solidFill>
+                  <a:schemeClr val="bg1"/>
+                </a:solidFill>
+              </a:rPr>
+              <a:t>Days-at-Sea</a:t>
+            </a:r>
+          </a:p>
+        </p:txBody>
+      </p:sp>
+      <p:sp>
+        <p:nvSpPr>
+          <p:cNvPr id="17" name="Rectangle 16">
+            <a:extLst>
+              <a:ext uri="{FF2B5EF4-FFF2-40B4-BE49-F238E27FC236}">
+                <a16:creationId xmlns:a16="http://schemas.microsoft.com/office/drawing/2014/main" id="{79BC48C3-5000-F12A-635B-9BA226155AD7}"/>
+              </a:ext>
+            </a:extLst>
+          </p:cNvPr>
+          <p:cNvSpPr/>
+          <p:nvPr/>
+        </p:nvSpPr>
+        <p:spPr>
+          <a:xfrm>
+            <a:off x="6602180" y="910928"/>
+            <a:ext cx="1247743" cy="347337"/>
+          </a:xfrm>
+          <a:prstGeom prst="rect">
+            <a:avLst/>
+          </a:prstGeom>
+          <a:solidFill>
+            <a:srgbClr val="D883FF"/>
+          </a:solidFill>
+          <a:ln>
+            <a:noFill/>
+          </a:ln>
+        </p:spPr>
+        <p:style>
+          <a:lnRef idx="2">
+            <a:schemeClr val="accent1">
+              <a:shade val="15000"/>
+            </a:schemeClr>
+          </a:lnRef>
+          <a:fillRef idx="1">
+            <a:schemeClr val="accent1"/>
+          </a:fillRef>
+          <a:effectRef idx="0">
+            <a:schemeClr val="accent1"/>
+          </a:effectRef>
+          <a:fontRef idx="minor">
+            <a:schemeClr val="lt1"/>
+          </a:fontRef>
+        </p:style>
+        <p:txBody>
+          <a:bodyPr rtlCol="0" anchor="ctr"/>
+          <a:lstStyle/>
+          <a:p>
+            <a:pPr algn="ctr"/>
+            <a:r>
+              <a:rPr lang="en-US" dirty="0"/>
+              <a:t>Effort</a:t>
             </a:r>
           </a:p>
         </p:txBody>

</xml_diff>

<commit_message>
added DAS specifications for scallop
</commit_message>
<xml_diff>
--- a/figures/flow_charts.pptx
+++ b/figures/flow_charts.pptx
@@ -7341,14 +7341,14 @@
       </dgm:t>
     </dgm:pt>
     <dgm:pt modelId="{D99A0CD7-62EA-5344-90EB-25E7B0A72E22}">
-      <dgm:prSet/>
+      <dgm:prSet custT="1"/>
       <dgm:spPr/>
       <dgm:t>
         <a:bodyPr/>
         <a:lstStyle/>
         <a:p>
           <a:r>
-            <a:rPr lang="en-US" dirty="0"/>
+            <a:rPr lang="en-US" sz="1400" dirty="0"/>
             <a:t>Individual Transferable Quota (ITQ)</a:t>
           </a:r>
         </a:p>
@@ -7377,14 +7377,14 @@
       </dgm:t>
     </dgm:pt>
     <dgm:pt modelId="{76A660BB-56A6-8F41-BC3E-78B959D09831}">
-      <dgm:prSet/>
+      <dgm:prSet custT="1"/>
       <dgm:spPr/>
       <dgm:t>
         <a:bodyPr/>
         <a:lstStyle/>
         <a:p>
           <a:r>
-            <a:rPr lang="en-US" dirty="0"/>
+            <a:rPr lang="en-US" sz="1400" dirty="0"/>
             <a:t>Non-ITQ</a:t>
           </a:r>
         </a:p>
@@ -7714,7 +7714,7 @@
       <dgm:spPr/>
     </dgm:pt>
     <dgm:pt modelId="{540C8371-8521-6E43-BCBE-82C4999C967F}" type="pres">
-      <dgm:prSet presAssocID="{D99A0CD7-62EA-5344-90EB-25E7B0A72E22}" presName="rootText" presStyleLbl="node4" presStyleIdx="0" presStyleCnt="2">
+      <dgm:prSet presAssocID="{D99A0CD7-62EA-5344-90EB-25E7B0A72E22}" presName="rootText" presStyleLbl="node4" presStyleIdx="0" presStyleCnt="2" custScaleY="48709" custLinFactNeighborY="56160">
         <dgm:presLayoutVars>
           <dgm:chPref val="3"/>
         </dgm:presLayoutVars>
@@ -7750,7 +7750,7 @@
       <dgm:spPr/>
     </dgm:pt>
     <dgm:pt modelId="{B6734A99-8241-C64D-9176-110278229A7E}" type="pres">
-      <dgm:prSet presAssocID="{76A660BB-56A6-8F41-BC3E-78B959D09831}" presName="rootText" presStyleLbl="node4" presStyleIdx="1" presStyleCnt="2">
+      <dgm:prSet presAssocID="{76A660BB-56A6-8F41-BC3E-78B959D09831}" presName="rootText" presStyleLbl="node4" presStyleIdx="1" presStyleCnt="2" custScaleY="40909" custLinFactNeighborY="52275">
         <dgm:presLayoutVars>
           <dgm:chPref val="3"/>
         </dgm:presLayoutVars>
@@ -13527,8 +13527,8 @@
       </dsp:nvSpPr>
       <dsp:spPr>
         <a:xfrm>
-          <a:off x="8774117" y="3486263"/>
-          <a:ext cx="266401" cy="2077931"/>
+          <a:off x="8774117" y="3976362"/>
+          <a:ext cx="266401" cy="1824304"/>
         </a:xfrm>
         <a:custGeom>
           <a:avLst/>
@@ -13542,10 +13542,10 @@
                 <a:pt x="0" y="0"/>
               </a:moveTo>
               <a:lnTo>
-                <a:pt x="0" y="2077931"/>
+                <a:pt x="0" y="1824304"/>
               </a:lnTo>
               <a:lnTo>
-                <a:pt x="266401" y="2077931"/>
+                <a:pt x="266401" y="1824304"/>
               </a:lnTo>
             </a:path>
           </a:pathLst>
@@ -13586,8 +13586,8 @@
       </dsp:nvSpPr>
       <dsp:spPr>
         <a:xfrm>
-          <a:off x="8774117" y="3486263"/>
-          <a:ext cx="266401" cy="816964"/>
+          <a:off x="8774117" y="3976362"/>
+          <a:ext cx="266401" cy="1087934"/>
         </a:xfrm>
         <a:custGeom>
           <a:avLst/>
@@ -13601,10 +13601,10 @@
                 <a:pt x="0" y="0"/>
               </a:moveTo>
               <a:lnTo>
-                <a:pt x="0" y="816964"/>
+                <a:pt x="0" y="1087934"/>
               </a:lnTo>
               <a:lnTo>
-                <a:pt x="266401" y="816964"/>
+                <a:pt x="266401" y="1087934"/>
               </a:lnTo>
             </a:path>
           </a:pathLst>
@@ -13645,7 +13645,7 @@
       </dsp:nvSpPr>
       <dsp:spPr>
         <a:xfrm>
-          <a:off x="7335548" y="2225296"/>
+          <a:off x="7335548" y="2715395"/>
           <a:ext cx="2148972" cy="372962"/>
         </a:xfrm>
         <a:custGeom>
@@ -13707,7 +13707,7 @@
       </dsp:nvSpPr>
       <dsp:spPr>
         <a:xfrm>
-          <a:off x="7289828" y="2225296"/>
+          <a:off x="7289828" y="2715395"/>
           <a:ext cx="91440" cy="372962"/>
         </a:xfrm>
         <a:custGeom>
@@ -13763,7 +13763,7 @@
       </dsp:nvSpPr>
       <dsp:spPr>
         <a:xfrm>
-          <a:off x="5186576" y="2225296"/>
+          <a:off x="5186576" y="2715395"/>
           <a:ext cx="2148972" cy="372962"/>
         </a:xfrm>
         <a:custGeom>
@@ -13825,7 +13825,7 @@
       </dsp:nvSpPr>
       <dsp:spPr>
         <a:xfrm>
-          <a:off x="4112090" y="964329"/>
+          <a:off x="4112090" y="1454428"/>
           <a:ext cx="3223458" cy="372962"/>
         </a:xfrm>
         <a:custGeom>
@@ -13887,7 +13887,7 @@
       </dsp:nvSpPr>
       <dsp:spPr>
         <a:xfrm>
-          <a:off x="4112090" y="964329"/>
+          <a:off x="4112090" y="1454428"/>
           <a:ext cx="1074486" cy="372962"/>
         </a:xfrm>
         <a:custGeom>
@@ -13949,7 +13949,7 @@
       </dsp:nvSpPr>
       <dsp:spPr>
         <a:xfrm>
-          <a:off x="3037604" y="964329"/>
+          <a:off x="3037604" y="1454428"/>
           <a:ext cx="1074486" cy="372962"/>
         </a:xfrm>
         <a:custGeom>
@@ -14011,7 +14011,7 @@
       </dsp:nvSpPr>
       <dsp:spPr>
         <a:xfrm>
-          <a:off x="888632" y="964329"/>
+          <a:off x="888632" y="1454428"/>
           <a:ext cx="3223458" cy="372962"/>
         </a:xfrm>
         <a:custGeom>
@@ -14073,7 +14073,7 @@
       </dsp:nvSpPr>
       <dsp:spPr>
         <a:xfrm>
-          <a:off x="3224085" y="76324"/>
+          <a:off x="3224085" y="566422"/>
           <a:ext cx="1776010" cy="888005"/>
         </a:xfrm>
         <a:prstGeom prst="rect">
@@ -14140,7 +14140,7 @@
         </a:p>
       </dsp:txBody>
       <dsp:txXfrm>
-        <a:off x="3224085" y="76324"/>
+        <a:off x="3224085" y="566422"/>
         <a:ext cx="1776010" cy="888005"/>
       </dsp:txXfrm>
     </dsp:sp>
@@ -14151,7 +14151,7 @@
       </dsp:nvSpPr>
       <dsp:spPr>
         <a:xfrm>
-          <a:off x="627" y="1337291"/>
+          <a:off x="627" y="1827390"/>
           <a:ext cx="1776010" cy="888005"/>
         </a:xfrm>
         <a:prstGeom prst="rect">
@@ -14213,7 +14213,7 @@
         </a:p>
       </dsp:txBody>
       <dsp:txXfrm>
-        <a:off x="627" y="1337291"/>
+        <a:off x="627" y="1827390"/>
         <a:ext cx="1776010" cy="888005"/>
       </dsp:txXfrm>
     </dsp:sp>
@@ -14224,7 +14224,7 @@
       </dsp:nvSpPr>
       <dsp:spPr>
         <a:xfrm>
-          <a:off x="2149599" y="1337291"/>
+          <a:off x="2149599" y="1827390"/>
           <a:ext cx="1776010" cy="888005"/>
         </a:xfrm>
         <a:prstGeom prst="rect">
@@ -14291,7 +14291,7 @@
         </a:p>
       </dsp:txBody>
       <dsp:txXfrm>
-        <a:off x="2149599" y="1337291"/>
+        <a:off x="2149599" y="1827390"/>
         <a:ext cx="1776010" cy="888005"/>
       </dsp:txXfrm>
     </dsp:sp>
@@ -14302,7 +14302,7 @@
       </dsp:nvSpPr>
       <dsp:spPr>
         <a:xfrm>
-          <a:off x="4298571" y="1337291"/>
+          <a:off x="4298571" y="1827390"/>
           <a:ext cx="1776010" cy="888005"/>
         </a:xfrm>
         <a:prstGeom prst="rect">
@@ -14369,7 +14369,7 @@
         </a:p>
       </dsp:txBody>
       <dsp:txXfrm>
-        <a:off x="4298571" y="1337291"/>
+        <a:off x="4298571" y="1827390"/>
         <a:ext cx="1776010" cy="888005"/>
       </dsp:txXfrm>
     </dsp:sp>
@@ -14380,7 +14380,7 @@
       </dsp:nvSpPr>
       <dsp:spPr>
         <a:xfrm>
-          <a:off x="6447543" y="1337291"/>
+          <a:off x="6447543" y="1827390"/>
           <a:ext cx="1776010" cy="888005"/>
         </a:xfrm>
         <a:prstGeom prst="rect">
@@ -14447,7 +14447,7 @@
         </a:p>
       </dsp:txBody>
       <dsp:txXfrm>
-        <a:off x="6447543" y="1337291"/>
+        <a:off x="6447543" y="1827390"/>
         <a:ext cx="1776010" cy="888005"/>
       </dsp:txXfrm>
     </dsp:sp>
@@ -14458,7 +14458,7 @@
       </dsp:nvSpPr>
       <dsp:spPr>
         <a:xfrm>
-          <a:off x="4298571" y="2598258"/>
+          <a:off x="4298571" y="3088357"/>
           <a:ext cx="1776010" cy="888005"/>
         </a:xfrm>
         <a:prstGeom prst="rect">
@@ -14525,7 +14525,7 @@
         </a:p>
       </dsp:txBody>
       <dsp:txXfrm>
-        <a:off x="4298571" y="2598258"/>
+        <a:off x="4298571" y="3088357"/>
         <a:ext cx="1776010" cy="888005"/>
       </dsp:txXfrm>
     </dsp:sp>
@@ -14536,7 +14536,7 @@
       </dsp:nvSpPr>
       <dsp:spPr>
         <a:xfrm>
-          <a:off x="6447543" y="2598258"/>
+          <a:off x="6447543" y="3088357"/>
           <a:ext cx="1776010" cy="888005"/>
         </a:xfrm>
         <a:prstGeom prst="rect">
@@ -14603,7 +14603,7 @@
         </a:p>
       </dsp:txBody>
       <dsp:txXfrm>
-        <a:off x="6447543" y="2598258"/>
+        <a:off x="6447543" y="3088357"/>
         <a:ext cx="1776010" cy="888005"/>
       </dsp:txXfrm>
     </dsp:sp>
@@ -14614,7 +14614,7 @@
       </dsp:nvSpPr>
       <dsp:spPr>
         <a:xfrm>
-          <a:off x="8596516" y="2598258"/>
+          <a:off x="8596516" y="3088357"/>
           <a:ext cx="1776010" cy="888005"/>
         </a:xfrm>
         <a:prstGeom prst="rect">
@@ -14681,7 +14681,7 @@
         </a:p>
       </dsp:txBody>
       <dsp:txXfrm>
-        <a:off x="8596516" y="2598258"/>
+        <a:off x="8596516" y="3088357"/>
         <a:ext cx="1776010" cy="888005"/>
       </dsp:txXfrm>
     </dsp:sp>
@@ -14692,8 +14692,8 @@
       </dsp:nvSpPr>
       <dsp:spPr>
         <a:xfrm>
-          <a:off x="9040518" y="3859225"/>
-          <a:ext cx="1776010" cy="888005"/>
+          <a:off x="9040518" y="4848028"/>
+          <a:ext cx="1776010" cy="432538"/>
         </a:xfrm>
         <a:prstGeom prst="rect">
           <a:avLst/>
@@ -14735,12 +14735,12 @@
         </a:fontRef>
       </dsp:style>
       <dsp:txBody>
-        <a:bodyPr spcFirstLastPara="0" vert="horz" wrap="square" lIns="12700" tIns="12700" rIns="12700" bIns="12700" numCol="1" spcCol="1270" anchor="ctr" anchorCtr="0">
+        <a:bodyPr spcFirstLastPara="0" vert="horz" wrap="square" lIns="8890" tIns="8890" rIns="8890" bIns="8890" numCol="1" spcCol="1270" anchor="ctr" anchorCtr="0">
           <a:noAutofit/>
         </a:bodyPr>
         <a:lstStyle/>
         <a:p>
-          <a:pPr marL="0" lvl="0" indent="0" algn="ctr" defTabSz="889000">
+          <a:pPr marL="0" lvl="0" indent="0" algn="ctr" defTabSz="622300">
             <a:lnSpc>
               <a:spcPct val="90000"/>
             </a:lnSpc>
@@ -14753,14 +14753,14 @@
             <a:buNone/>
           </a:pPr>
           <a:r>
-            <a:rPr lang="en-US" sz="2000" kern="1200" dirty="0"/>
+            <a:rPr lang="en-US" sz="1400" kern="1200" dirty="0"/>
             <a:t>Individual Transferable Quota (ITQ)</a:t>
           </a:r>
         </a:p>
       </dsp:txBody>
       <dsp:txXfrm>
-        <a:off x="9040518" y="3859225"/>
-        <a:ext cx="1776010" cy="888005"/>
+        <a:off x="9040518" y="4848028"/>
+        <a:ext cx="1776010" cy="432538"/>
       </dsp:txXfrm>
     </dsp:sp>
     <dsp:sp modelId="{B6734A99-8241-C64D-9176-110278229A7E}">
@@ -14770,8 +14770,8 @@
       </dsp:nvSpPr>
       <dsp:spPr>
         <a:xfrm>
-          <a:off x="9040518" y="5120192"/>
-          <a:ext cx="1776010" cy="888005"/>
+          <a:off x="9040518" y="5619029"/>
+          <a:ext cx="1776010" cy="363273"/>
         </a:xfrm>
         <a:prstGeom prst="rect">
           <a:avLst/>
@@ -14813,12 +14813,12 @@
         </a:fontRef>
       </dsp:style>
       <dsp:txBody>
-        <a:bodyPr spcFirstLastPara="0" vert="horz" wrap="square" lIns="12700" tIns="12700" rIns="12700" bIns="12700" numCol="1" spcCol="1270" anchor="ctr" anchorCtr="0">
+        <a:bodyPr spcFirstLastPara="0" vert="horz" wrap="square" lIns="8890" tIns="8890" rIns="8890" bIns="8890" numCol="1" spcCol="1270" anchor="ctr" anchorCtr="0">
           <a:noAutofit/>
         </a:bodyPr>
         <a:lstStyle/>
         <a:p>
-          <a:pPr marL="0" lvl="0" indent="0" algn="ctr" defTabSz="889000">
+          <a:pPr marL="0" lvl="0" indent="0" algn="ctr" defTabSz="622300">
             <a:lnSpc>
               <a:spcPct val="90000"/>
             </a:lnSpc>
@@ -14831,14 +14831,14 @@
             <a:buNone/>
           </a:pPr>
           <a:r>
-            <a:rPr lang="en-US" sz="2000" kern="1200" dirty="0"/>
+            <a:rPr lang="en-US" sz="1400" kern="1200" dirty="0"/>
             <a:t>Non-ITQ</a:t>
           </a:r>
         </a:p>
       </dsp:txBody>
       <dsp:txXfrm>
-        <a:off x="9040518" y="5120192"/>
-        <a:ext cx="1776010" cy="888005"/>
+        <a:off x="9040518" y="5619029"/>
+        <a:ext cx="1776010" cy="363273"/>
       </dsp:txXfrm>
     </dsp:sp>
   </dsp:spTree>
@@ -26963,7 +26963,7 @@
           <a:p>
             <a:fld id="{7FCD9E77-C000-8647-A168-CF67FEF06FB1}" type="datetimeFigureOut">
               <a:rPr lang="en-US" smtClean="0"/>
-              <a:t>3/22/24</a:t>
+              <a:t>3/24/24</a:t>
             </a:fld>
             <a:endParaRPr lang="en-US"/>
           </a:p>
@@ -27161,7 +27161,7 @@
           <a:p>
             <a:fld id="{7FCD9E77-C000-8647-A168-CF67FEF06FB1}" type="datetimeFigureOut">
               <a:rPr lang="en-US" smtClean="0"/>
-              <a:t>3/22/24</a:t>
+              <a:t>3/24/24</a:t>
             </a:fld>
             <a:endParaRPr lang="en-US"/>
           </a:p>
@@ -27369,7 +27369,7 @@
           <a:p>
             <a:fld id="{7FCD9E77-C000-8647-A168-CF67FEF06FB1}" type="datetimeFigureOut">
               <a:rPr lang="en-US" smtClean="0"/>
-              <a:t>3/22/24</a:t>
+              <a:t>3/24/24</a:t>
             </a:fld>
             <a:endParaRPr lang="en-US"/>
           </a:p>
@@ -27567,7 +27567,7 @@
           <a:p>
             <a:fld id="{7FCD9E77-C000-8647-A168-CF67FEF06FB1}" type="datetimeFigureOut">
               <a:rPr lang="en-US" smtClean="0"/>
-              <a:t>3/22/24</a:t>
+              <a:t>3/24/24</a:t>
             </a:fld>
             <a:endParaRPr lang="en-US"/>
           </a:p>
@@ -27842,7 +27842,7 @@
           <a:p>
             <a:fld id="{7FCD9E77-C000-8647-A168-CF67FEF06FB1}" type="datetimeFigureOut">
               <a:rPr lang="en-US" smtClean="0"/>
-              <a:t>3/22/24</a:t>
+              <a:t>3/24/24</a:t>
             </a:fld>
             <a:endParaRPr lang="en-US"/>
           </a:p>
@@ -28107,7 +28107,7 @@
           <a:p>
             <a:fld id="{7FCD9E77-C000-8647-A168-CF67FEF06FB1}" type="datetimeFigureOut">
               <a:rPr lang="en-US" smtClean="0"/>
-              <a:t>3/22/24</a:t>
+              <a:t>3/24/24</a:t>
             </a:fld>
             <a:endParaRPr lang="en-US"/>
           </a:p>
@@ -28519,7 +28519,7 @@
           <a:p>
             <a:fld id="{7FCD9E77-C000-8647-A168-CF67FEF06FB1}" type="datetimeFigureOut">
               <a:rPr lang="en-US" smtClean="0"/>
-              <a:t>3/22/24</a:t>
+              <a:t>3/24/24</a:t>
             </a:fld>
             <a:endParaRPr lang="en-US"/>
           </a:p>
@@ -28660,7 +28660,7 @@
           <a:p>
             <a:fld id="{7FCD9E77-C000-8647-A168-CF67FEF06FB1}" type="datetimeFigureOut">
               <a:rPr lang="en-US" smtClean="0"/>
-              <a:t>3/22/24</a:t>
+              <a:t>3/24/24</a:t>
             </a:fld>
             <a:endParaRPr lang="en-US"/>
           </a:p>
@@ -28773,7 +28773,7 @@
           <a:p>
             <a:fld id="{7FCD9E77-C000-8647-A168-CF67FEF06FB1}" type="datetimeFigureOut">
               <a:rPr lang="en-US" smtClean="0"/>
-              <a:t>3/22/24</a:t>
+              <a:t>3/24/24</a:t>
             </a:fld>
             <a:endParaRPr lang="en-US"/>
           </a:p>
@@ -29084,7 +29084,7 @@
           <a:p>
             <a:fld id="{7FCD9E77-C000-8647-A168-CF67FEF06FB1}" type="datetimeFigureOut">
               <a:rPr lang="en-US" smtClean="0"/>
-              <a:t>3/22/24</a:t>
+              <a:t>3/24/24</a:t>
             </a:fld>
             <a:endParaRPr lang="en-US"/>
           </a:p>
@@ -29372,7 +29372,7 @@
           <a:p>
             <a:fld id="{7FCD9E77-C000-8647-A168-CF67FEF06FB1}" type="datetimeFigureOut">
               <a:rPr lang="en-US" smtClean="0"/>
-              <a:t>3/22/24</a:t>
+              <a:t>3/24/24</a:t>
             </a:fld>
             <a:endParaRPr lang="en-US"/>
           </a:p>
@@ -29613,7 +29613,7 @@
           <a:p>
             <a:fld id="{7FCD9E77-C000-8647-A168-CF67FEF06FB1}" type="datetimeFigureOut">
               <a:rPr lang="en-US" smtClean="0"/>
-              <a:t>3/22/24</a:t>
+              <a:t>3/24/24</a:t>
             </a:fld>
             <a:endParaRPr lang="en-US"/>
           </a:p>
@@ -31047,7 +31047,7 @@
           <p:nvPr>
             <p:extLst>
               <p:ext uri="{D42A27DB-BD31-4B8C-83A1-F6EECF244321}">
-                <p14:modId xmlns:p14="http://schemas.microsoft.com/office/powerpoint/2010/main" val="1568470147"/>
+                <p14:modId xmlns:p14="http://schemas.microsoft.com/office/powerpoint/2010/main" val="2443976242"/>
               </p:ext>
             </p:extLst>
           </p:nvPr>
@@ -31111,7 +31111,7 @@
         </p:nvSpPr>
         <p:spPr>
           <a:xfrm>
-            <a:off x="7594600" y="4445000"/>
+            <a:off x="7594600" y="4922974"/>
             <a:ext cx="1447800" cy="914400"/>
           </a:xfrm>
           <a:prstGeom prst="rect">
@@ -31166,7 +31166,7 @@
         </p:nvCxnSpPr>
         <p:spPr>
           <a:xfrm>
-            <a:off x="7962900" y="4191000"/>
+            <a:off x="7962900" y="4668974"/>
             <a:ext cx="355600" cy="254000"/>
           </a:xfrm>
           <a:prstGeom prst="line">
@@ -31208,9 +31208,9 @@
           <p:nvPr/>
         </p:nvCxnSpPr>
         <p:spPr>
-          <a:xfrm>
-            <a:off x="9042400" y="5016500"/>
-            <a:ext cx="558800" cy="0"/>
+          <a:xfrm flipV="1">
+            <a:off x="9042400" y="5777433"/>
+            <a:ext cx="281709" cy="1155"/>
           </a:xfrm>
           <a:prstGeom prst="line">
             <a:avLst/>
@@ -31308,8 +31308,8 @@
         </p:nvCxnSpPr>
         <p:spPr>
           <a:xfrm flipH="1">
-            <a:off x="6819900" y="4902200"/>
-            <a:ext cx="774700" cy="1329315"/>
+            <a:off x="6819900" y="5380174"/>
+            <a:ext cx="774700" cy="457200"/>
           </a:xfrm>
           <a:prstGeom prst="line">
             <a:avLst/>
@@ -31706,6 +31706,247 @@
           <a:p>
             <a:pPr algn="ctr"/>
             <a:endParaRPr lang="en-US"/>
+          </a:p>
+        </p:txBody>
+      </p:sp>
+      <p:sp>
+        <p:nvSpPr>
+          <p:cNvPr id="5" name="TextBox 4">
+            <a:extLst>
+              <a:ext uri="{FF2B5EF4-FFF2-40B4-BE49-F238E27FC236}">
+                <a16:creationId xmlns:a16="http://schemas.microsoft.com/office/drawing/2014/main" id="{1A09C352-94D7-4EE8-669E-08FA25C62318}"/>
+              </a:ext>
+            </a:extLst>
+          </p:cNvPr>
+          <p:cNvSpPr txBox="1"/>
+          <p:nvPr/>
+        </p:nvSpPr>
+        <p:spPr>
+          <a:xfrm>
+            <a:off x="1101147" y="4703777"/>
+            <a:ext cx="4197928" cy="2246769"/>
+          </a:xfrm>
+          <a:prstGeom prst="rect">
+            <a:avLst/>
+          </a:prstGeom>
+          <a:noFill/>
+        </p:spPr>
+        <p:txBody>
+          <a:bodyPr wrap="square" rtlCol="0">
+            <a:spAutoFit/>
+          </a:bodyPr>
+          <a:lstStyle/>
+          <a:p>
+            <a:r>
+              <a:rPr lang="en-US" sz="1400" dirty="0"/>
+              <a:t>Full-time: </a:t>
+            </a:r>
+          </a:p>
+          <a:p>
+            <a:pPr marL="285750" indent="-285750">
+              <a:buFont typeface="Arial" panose="020B0604020202020204" pitchFamily="34" charset="0"/>
+              <a:buChar char="•"/>
+            </a:pPr>
+            <a:r>
+              <a:rPr lang="en-US" sz="1400" dirty="0"/>
+              <a:t>3 12,000 lbs. access area trips with 2 trips into Area II and one into NY Bight</a:t>
+            </a:r>
+          </a:p>
+          <a:p>
+            <a:pPr marL="285750" indent="-285750">
+              <a:buFont typeface="Arial" panose="020B0604020202020204" pitchFamily="34" charset="0"/>
+              <a:buChar char="•"/>
+            </a:pPr>
+            <a:r>
+              <a:rPr lang="en-US" sz="1400" dirty="0"/>
+              <a:t>20 open area DAS </a:t>
+            </a:r>
+          </a:p>
+          <a:p>
+            <a:r>
+              <a:rPr lang="en-US" sz="1400" dirty="0"/>
+              <a:t>Part-time:</a:t>
+            </a:r>
+          </a:p>
+          <a:p>
+            <a:pPr marL="285750" indent="-285750">
+              <a:buFont typeface="Arial" panose="020B0604020202020204" pitchFamily="34" charset="0"/>
+              <a:buChar char="•"/>
+            </a:pPr>
+            <a:r>
+              <a:rPr lang="en-US" sz="1400" dirty="0"/>
+              <a:t>1 14,400 lbs. in either Area II or NY Bight</a:t>
+            </a:r>
+          </a:p>
+          <a:p>
+            <a:pPr marL="285750" indent="-285750">
+              <a:buFont typeface="Arial" panose="020B0604020202020204" pitchFamily="34" charset="0"/>
+              <a:buChar char="•"/>
+            </a:pPr>
+            <a:r>
+              <a:rPr lang="en-US" sz="1400" dirty="0"/>
+              <a:t>8 open area DAS (always 40% of full-time)</a:t>
+            </a:r>
+          </a:p>
+          <a:p>
+            <a:r>
+              <a:rPr lang="en-US" sz="1400" dirty="0"/>
+              <a:t>Occasional</a:t>
+            </a:r>
+          </a:p>
+          <a:p>
+            <a:r>
+              <a:rPr lang="en-US" sz="1400" dirty="0"/>
+              <a:t>1.67 open area DAS (always 8.33% of full-time)</a:t>
+            </a:r>
+          </a:p>
+          <a:p>
+            <a:endParaRPr lang="en-US" sz="1400" dirty="0"/>
+          </a:p>
+        </p:txBody>
+      </p:sp>
+      <p:sp>
+        <p:nvSpPr>
+          <p:cNvPr id="6" name="TextBox 5">
+            <a:extLst>
+              <a:ext uri="{FF2B5EF4-FFF2-40B4-BE49-F238E27FC236}">
+                <a16:creationId xmlns:a16="http://schemas.microsoft.com/office/drawing/2014/main" id="{E5DE7574-E92A-B4AD-005F-789C304FA46F}"/>
+              </a:ext>
+            </a:extLst>
+          </p:cNvPr>
+          <p:cNvSpPr txBox="1"/>
+          <p:nvPr/>
+        </p:nvSpPr>
+        <p:spPr>
+          <a:xfrm>
+            <a:off x="11125196" y="3826531"/>
+            <a:ext cx="1231903" cy="1323439"/>
+          </a:xfrm>
+          <a:prstGeom prst="rect">
+            <a:avLst/>
+          </a:prstGeom>
+          <a:noFill/>
+        </p:spPr>
+        <p:txBody>
+          <a:bodyPr wrap="square" rtlCol="0">
+            <a:spAutoFit/>
+          </a:bodyPr>
+          <a:lstStyle/>
+          <a:p>
+            <a:r>
+              <a:rPr lang="en-US" sz="1600" dirty="0"/>
+              <a:t>856 access area trips across Area I, Area II, &amp; NY Bight</a:t>
+            </a:r>
+          </a:p>
+        </p:txBody>
+      </p:sp>
+      <p:sp>
+        <p:nvSpPr>
+          <p:cNvPr id="9" name="Rectangle 8">
+            <a:extLst>
+              <a:ext uri="{FF2B5EF4-FFF2-40B4-BE49-F238E27FC236}">
+                <a16:creationId xmlns:a16="http://schemas.microsoft.com/office/drawing/2014/main" id="{C3FC4416-2360-85F0-9FF2-89A56131610B}"/>
+              </a:ext>
+            </a:extLst>
+          </p:cNvPr>
+          <p:cNvSpPr/>
+          <p:nvPr/>
+        </p:nvSpPr>
+        <p:spPr>
+          <a:xfrm>
+            <a:off x="9124793" y="4776632"/>
+            <a:ext cx="1013370" cy="378113"/>
+          </a:xfrm>
+          <a:prstGeom prst="rect">
+            <a:avLst/>
+          </a:prstGeom>
+          <a:solidFill>
+            <a:schemeClr val="accent6"/>
+          </a:solidFill>
+          <a:ln>
+            <a:noFill/>
+          </a:ln>
+        </p:spPr>
+        <p:style>
+          <a:lnRef idx="2">
+            <a:schemeClr val="accent1">
+              <a:shade val="15000"/>
+            </a:schemeClr>
+          </a:lnRef>
+          <a:fillRef idx="1">
+            <a:schemeClr val="accent1"/>
+          </a:fillRef>
+          <a:effectRef idx="0">
+            <a:schemeClr val="accent1"/>
+          </a:effectRef>
+          <a:fontRef idx="minor">
+            <a:schemeClr val="lt1"/>
+          </a:fontRef>
+        </p:style>
+        <p:txBody>
+          <a:bodyPr rtlCol="0" anchor="ctr"/>
+          <a:lstStyle/>
+          <a:p>
+            <a:pPr algn="ctr"/>
+            <a:r>
+              <a:rPr lang="en-US" sz="1200" dirty="0"/>
+              <a:t>Access area allocations</a:t>
+            </a:r>
+          </a:p>
+        </p:txBody>
+      </p:sp>
+      <p:sp>
+        <p:nvSpPr>
+          <p:cNvPr id="11" name="Rectangle 10">
+            <a:extLst>
+              <a:ext uri="{FF2B5EF4-FFF2-40B4-BE49-F238E27FC236}">
+                <a16:creationId xmlns:a16="http://schemas.microsoft.com/office/drawing/2014/main" id="{A7DD4238-246F-BCCF-47E4-F8C552D65296}"/>
+              </a:ext>
+            </a:extLst>
+          </p:cNvPr>
+          <p:cNvSpPr/>
+          <p:nvPr/>
+        </p:nvSpPr>
+        <p:spPr>
+          <a:xfrm>
+            <a:off x="10139537" y="4767385"/>
+            <a:ext cx="1013370" cy="378113"/>
+          </a:xfrm>
+          <a:prstGeom prst="rect">
+            <a:avLst/>
+          </a:prstGeom>
+          <a:solidFill>
+            <a:srgbClr val="D883FF"/>
+          </a:solidFill>
+          <a:ln>
+            <a:noFill/>
+          </a:ln>
+        </p:spPr>
+        <p:style>
+          <a:lnRef idx="2">
+            <a:schemeClr val="accent1">
+              <a:shade val="15000"/>
+            </a:schemeClr>
+          </a:lnRef>
+          <a:fillRef idx="1">
+            <a:schemeClr val="accent1"/>
+          </a:fillRef>
+          <a:effectRef idx="0">
+            <a:schemeClr val="accent1"/>
+          </a:effectRef>
+          <a:fontRef idx="minor">
+            <a:schemeClr val="lt1"/>
+          </a:fontRef>
+        </p:style>
+        <p:txBody>
+          <a:bodyPr rtlCol="0" anchor="ctr"/>
+          <a:lstStyle/>
+          <a:p>
+            <a:pPr algn="ctr"/>
+            <a:r>
+              <a:rPr lang="en-US" sz="1200" dirty="0"/>
+              <a:t>Days at Sea</a:t>
+            </a:r>
           </a:p>
         </p:txBody>
       </p:sp>

</xml_diff>

<commit_message>
small edit to flow chart for groundfish in NE
</commit_message>
<xml_diff>
--- a/figures/flow_charts.pptx
+++ b/figures/flow_charts.pptx
@@ -26963,7 +26963,7 @@
           <a:p>
             <a:fld id="{7FCD9E77-C000-8647-A168-CF67FEF06FB1}" type="datetimeFigureOut">
               <a:rPr lang="en-US" smtClean="0"/>
-              <a:t>3/24/24</a:t>
+              <a:t>3/25/24</a:t>
             </a:fld>
             <a:endParaRPr lang="en-US"/>
           </a:p>
@@ -27161,7 +27161,7 @@
           <a:p>
             <a:fld id="{7FCD9E77-C000-8647-A168-CF67FEF06FB1}" type="datetimeFigureOut">
               <a:rPr lang="en-US" smtClean="0"/>
-              <a:t>3/24/24</a:t>
+              <a:t>3/25/24</a:t>
             </a:fld>
             <a:endParaRPr lang="en-US"/>
           </a:p>
@@ -27369,7 +27369,7 @@
           <a:p>
             <a:fld id="{7FCD9E77-C000-8647-A168-CF67FEF06FB1}" type="datetimeFigureOut">
               <a:rPr lang="en-US" smtClean="0"/>
-              <a:t>3/24/24</a:t>
+              <a:t>3/25/24</a:t>
             </a:fld>
             <a:endParaRPr lang="en-US"/>
           </a:p>
@@ -27567,7 +27567,7 @@
           <a:p>
             <a:fld id="{7FCD9E77-C000-8647-A168-CF67FEF06FB1}" type="datetimeFigureOut">
               <a:rPr lang="en-US" smtClean="0"/>
-              <a:t>3/24/24</a:t>
+              <a:t>3/25/24</a:t>
             </a:fld>
             <a:endParaRPr lang="en-US"/>
           </a:p>
@@ -27842,7 +27842,7 @@
           <a:p>
             <a:fld id="{7FCD9E77-C000-8647-A168-CF67FEF06FB1}" type="datetimeFigureOut">
               <a:rPr lang="en-US" smtClean="0"/>
-              <a:t>3/24/24</a:t>
+              <a:t>3/25/24</a:t>
             </a:fld>
             <a:endParaRPr lang="en-US"/>
           </a:p>
@@ -28107,7 +28107,7 @@
           <a:p>
             <a:fld id="{7FCD9E77-C000-8647-A168-CF67FEF06FB1}" type="datetimeFigureOut">
               <a:rPr lang="en-US" smtClean="0"/>
-              <a:t>3/24/24</a:t>
+              <a:t>3/25/24</a:t>
             </a:fld>
             <a:endParaRPr lang="en-US"/>
           </a:p>
@@ -28519,7 +28519,7 @@
           <a:p>
             <a:fld id="{7FCD9E77-C000-8647-A168-CF67FEF06FB1}" type="datetimeFigureOut">
               <a:rPr lang="en-US" smtClean="0"/>
-              <a:t>3/24/24</a:t>
+              <a:t>3/25/24</a:t>
             </a:fld>
             <a:endParaRPr lang="en-US"/>
           </a:p>
@@ -28660,7 +28660,7 @@
           <a:p>
             <a:fld id="{7FCD9E77-C000-8647-A168-CF67FEF06FB1}" type="datetimeFigureOut">
               <a:rPr lang="en-US" smtClean="0"/>
-              <a:t>3/24/24</a:t>
+              <a:t>3/25/24</a:t>
             </a:fld>
             <a:endParaRPr lang="en-US"/>
           </a:p>
@@ -28773,7 +28773,7 @@
           <a:p>
             <a:fld id="{7FCD9E77-C000-8647-A168-CF67FEF06FB1}" type="datetimeFigureOut">
               <a:rPr lang="en-US" smtClean="0"/>
-              <a:t>3/24/24</a:t>
+              <a:t>3/25/24</a:t>
             </a:fld>
             <a:endParaRPr lang="en-US"/>
           </a:p>
@@ -29084,7 +29084,7 @@
           <a:p>
             <a:fld id="{7FCD9E77-C000-8647-A168-CF67FEF06FB1}" type="datetimeFigureOut">
               <a:rPr lang="en-US" smtClean="0"/>
-              <a:t>3/24/24</a:t>
+              <a:t>3/25/24</a:t>
             </a:fld>
             <a:endParaRPr lang="en-US"/>
           </a:p>
@@ -29372,7 +29372,7 @@
           <a:p>
             <a:fld id="{7FCD9E77-C000-8647-A168-CF67FEF06FB1}" type="datetimeFigureOut">
               <a:rPr lang="en-US" smtClean="0"/>
-              <a:t>3/24/24</a:t>
+              <a:t>3/25/24</a:t>
             </a:fld>
             <a:endParaRPr lang="en-US"/>
           </a:p>
@@ -29613,7 +29613,7 @@
           <a:p>
             <a:fld id="{7FCD9E77-C000-8647-A168-CF67FEF06FB1}" type="datetimeFigureOut">
               <a:rPr lang="en-US" smtClean="0"/>
-              <a:t>3/24/24</a:t>
+              <a:t>3/25/24</a:t>
             </a:fld>
             <a:endParaRPr lang="en-US"/>
           </a:p>
@@ -30654,7 +30654,7 @@
         </p:nvSpPr>
         <p:spPr>
           <a:xfrm>
-            <a:off x="10344724" y="4206448"/>
+            <a:off x="12259338" y="3835380"/>
             <a:ext cx="1914615" cy="1200329"/>
           </a:xfrm>
           <a:prstGeom prst="rect">

</xml_diff>